<commit_message>
resize photos and fix typos
</commit_message>
<xml_diff>
--- a/spark/operations_and_partitions/spark_operations_partitions_graphics.pptx
+++ b/spark/operations_and_partitions/spark_operations_partitions_graphics.pptx
@@ -7248,7 +7248,7 @@
         </p:nvSpPr>
         <p:spPr>
           <a:xfrm>
-            <a:off x="3098135" y="3452382"/>
+            <a:off x="3098135" y="3460474"/>
             <a:ext cx="868680" cy="121872"/>
           </a:xfrm>
           <a:prstGeom prst="rect">
@@ -9129,7 +9129,7 @@
         </p:nvSpPr>
         <p:spPr>
           <a:xfrm>
-            <a:off x="6353326" y="4927305"/>
+            <a:off x="6345234" y="4927305"/>
             <a:ext cx="868680" cy="121872"/>
           </a:xfrm>
           <a:prstGeom prst="rect">

</xml_diff>